<commit_message>
Update README.md and documents
</commit_message>
<xml_diff>
--- a/Docs/PrimeraEntrega.pptx
+++ b/Docs/PrimeraEntrega.pptx
@@ -32069,6 +32069,12 @@
           </a:bodyPr>
           <a:lstStyle/>
           <a:p>
+            <a:r>
+              <a:rPr lang="es-MX" dirty="0"/>
+              <a:t>El cáncer de piel se ha convertido en un problema de salud pública actualmente, gracias a una investigación realizada por el periódico vanguardia sabemos que en el país se incrementó el número de casos de 300 a 500 por ciento en los pasados 10 años.</a:t>
+            </a:r>
+          </a:p>
+          <a:p>
             <a:pPr marL="457200" lvl="0" indent="-355600" algn="l" rtl="0">
               <a:spcBef>
                 <a:spcPts val="0"/>
@@ -32079,72 +32085,6 @@
               <a:buSzPts val="2000"/>
               <a:buChar char="○"/>
             </a:pPr>
-            <a:r>
-              <a:rPr lang="en" dirty="0"/>
-              <a:t>Here you have a list of items</a:t>
-            </a:r>
-            <a:endParaRPr dirty="0"/>
-          </a:p>
-          <a:p>
-            <a:pPr marL="457200" lvl="0" indent="-355600" algn="l" rtl="0">
-              <a:spcBef>
-                <a:spcPts val="1000"/>
-              </a:spcBef>
-              <a:spcAft>
-                <a:spcPts val="0"/>
-              </a:spcAft>
-              <a:buSzPts val="2000"/>
-              <a:buChar char="○"/>
-            </a:pPr>
-            <a:r>
-              <a:rPr lang="en" dirty="0"/>
-              <a:t>And some text</a:t>
-            </a:r>
-            <a:endParaRPr dirty="0"/>
-          </a:p>
-          <a:p>
-            <a:pPr marL="457200" lvl="0" indent="-355600" algn="l" rtl="0">
-              <a:spcBef>
-                <a:spcPts val="1000"/>
-              </a:spcBef>
-              <a:spcAft>
-                <a:spcPts val="0"/>
-              </a:spcAft>
-              <a:buSzPts val="2000"/>
-              <a:buChar char="○"/>
-            </a:pPr>
-            <a:r>
-              <a:rPr lang="en" dirty="0"/>
-              <a:t>But remember not to overload your slides with content</a:t>
-            </a:r>
-            <a:endParaRPr dirty="0"/>
-          </a:p>
-          <a:p>
-            <a:pPr marL="0" lvl="0" indent="0" algn="l" rtl="0">
-              <a:spcBef>
-                <a:spcPts val="1000"/>
-              </a:spcBef>
-              <a:spcAft>
-                <a:spcPts val="0"/>
-              </a:spcAft>
-              <a:buNone/>
-            </a:pPr>
-            <a:endParaRPr dirty="0"/>
-          </a:p>
-          <a:p>
-            <a:pPr marL="0" lvl="0" indent="0" algn="l" rtl="0">
-              <a:spcBef>
-                <a:spcPts val="1000"/>
-              </a:spcBef>
-              <a:spcAft>
-                <a:spcPts val="1000"/>
-              </a:spcAft>
-              <a:buNone/>
-            </a:pPr>
-            <a:r>
-              <a:rPr lang="en" dirty="0"/>
-              <a:t>Your audience will listen to you or read the content, but won’t do both. </a:t>
-            </a:r>
             <a:endParaRPr dirty="0"/>
           </a:p>
         </p:txBody>

</xml_diff>